<commit_message>
Alg e Comp Exerc Alg Gulosos 22102025
</commit_message>
<xml_diff>
--- a/01 Classes/Aula 10 - Algoritmos e Complexidade - Algoritmos Gulosos.pptx
+++ b/01 Classes/Aula 10 - Algoritmos e Complexidade - Algoritmos Gulosos.pptx
@@ -5603,49 +5603,16 @@
           </a:bodyPr>
           <a:lstStyle/>
           <a:p>
-            <a:pPr marL="0" indent="0">
-              <a:buNone/>
+            <a:pPr>
+              <a:buFont typeface="Wingdings" panose="05000000000000000000" pitchFamily="2" charset="2"/>
+              <a:buChar char="§"/>
             </a:pPr>
             <a:r>
-              <a:rPr lang="pt-BR" sz="2200" b="1" dirty="0" err="1">
-                <a:solidFill>
-                  <a:srgbClr val="FF0000"/>
-                </a:solidFill>
-                <a:latin typeface="Times New Roman" panose="02020603050405020304" pitchFamily="18" charset="0"/>
-                <a:cs typeface="Times New Roman" panose="02020603050405020304" pitchFamily="18" charset="0"/>
-              </a:rPr>
-              <a:t>Pseudo</a:t>
-            </a:r>
-            <a:r>
-              <a:rPr lang="pt-BR" sz="2200" b="1" dirty="0">
-                <a:solidFill>
-                  <a:srgbClr val="FF0000"/>
-                </a:solidFill>
-                <a:latin typeface="Times New Roman" panose="02020603050405020304" pitchFamily="18" charset="0"/>
-                <a:cs typeface="Times New Roman" panose="02020603050405020304" pitchFamily="18" charset="0"/>
-              </a:rPr>
-              <a:t> solução</a:t>
-            </a:r>
-            <a:r>
               <a:rPr lang="pt-BR" sz="2200" dirty="0">
                 <a:latin typeface="Times New Roman" panose="02020603050405020304" pitchFamily="18" charset="0"/>
                 <a:cs typeface="Times New Roman" panose="02020603050405020304" pitchFamily="18" charset="0"/>
               </a:rPr>
-              <a:t>: </a:t>
-            </a:r>
-            <a:r>
-              <a:rPr lang="pt-BR" sz="2200" b="1" dirty="0">
-                <a:latin typeface="Times New Roman" panose="02020603050405020304" pitchFamily="18" charset="0"/>
-                <a:cs typeface="Times New Roman" panose="02020603050405020304" pitchFamily="18" charset="0"/>
-              </a:rPr>
-              <a:t>A7; A2; A4; A5</a:t>
-            </a:r>
-            <a:r>
-              <a:rPr lang="pt-BR" sz="2200" dirty="0">
-                <a:latin typeface="Times New Roman" panose="02020603050405020304" pitchFamily="18" charset="0"/>
-                <a:cs typeface="Times New Roman" panose="02020603050405020304" pitchFamily="18" charset="0"/>
-              </a:rPr>
-              <a:t>.</a:t>
+              <a:t>A estratégia gulosa sempre gera o melhor resultado?</a:t>
             </a:r>
           </a:p>
           <a:p>
@@ -5667,8 +5634,17 @@
                 <a:latin typeface="Times New Roman" panose="02020603050405020304" pitchFamily="18" charset="0"/>
                 <a:cs typeface="Times New Roman" panose="02020603050405020304" pitchFamily="18" charset="0"/>
               </a:rPr>
-              <a:t>A estratégia gulosa sempre gera o melhor resultado?</a:t>
-            </a:r>
+              <a:t>Que outra estratégia vocês tentaram?</a:t>
+            </a:r>
+          </a:p>
+          <a:p>
+            <a:pPr marL="0" indent="0">
+              <a:buNone/>
+            </a:pPr>
+            <a:endParaRPr lang="pt-BR" sz="2200" dirty="0">
+              <a:latin typeface="Times New Roman" panose="02020603050405020304" pitchFamily="18" charset="0"/>
+              <a:cs typeface="Times New Roman" panose="02020603050405020304" pitchFamily="18" charset="0"/>
+            </a:endParaRPr>
           </a:p>
           <a:p>
             <a:pPr>
@@ -5680,21 +5656,47 @@
                 <a:latin typeface="Times New Roman" panose="02020603050405020304" pitchFamily="18" charset="0"/>
                 <a:cs typeface="Times New Roman" panose="02020603050405020304" pitchFamily="18" charset="0"/>
               </a:rPr>
-              <a:t>Que outra estratégia vocês tentaram?</a:t>
-            </a:r>
-          </a:p>
-          <a:p>
-            <a:pPr>
+              <a:t>Em quais casos o método guloso poderia falhar?</a:t>
+            </a:r>
+          </a:p>
+          <a:p>
+            <a:pPr lvl="1">
               <a:buFont typeface="Wingdings" panose="05000000000000000000" pitchFamily="2" charset="2"/>
               <a:buChar char="§"/>
             </a:pPr>
             <a:r>
-              <a:rPr lang="pt-BR" sz="2200" dirty="0">
-                <a:latin typeface="Times New Roman" panose="02020603050405020304" pitchFamily="18" charset="0"/>
-                <a:cs typeface="Times New Roman" panose="02020603050405020304" pitchFamily="18" charset="0"/>
-              </a:rPr>
-              <a:t>Em quais casos o método guloso poderia falhar?</a:t>
-            </a:r>
+              <a:rPr lang="pt-BR" sz="2200" b="1" dirty="0">
+                <a:latin typeface="Times New Roman" panose="02020603050405020304" pitchFamily="18" charset="0"/>
+                <a:cs typeface="Times New Roman" panose="02020603050405020304" pitchFamily="18" charset="0"/>
+              </a:rPr>
+              <a:t>Ex.: </a:t>
+            </a:r>
+            <a:r>
+              <a:rPr lang="pt-BR" sz="2200" b="1" dirty="0">
+                <a:solidFill>
+                  <a:srgbClr val="FF0000"/>
+                </a:solidFill>
+                <a:latin typeface="Times New Roman" panose="02020603050405020304" pitchFamily="18" charset="0"/>
+                <a:cs typeface="Times New Roman" panose="02020603050405020304" pitchFamily="18" charset="0"/>
+              </a:rPr>
+              <a:t>A1; A2; A3; A4</a:t>
+            </a:r>
+            <a:endParaRPr lang="pt-BR" sz="2200" dirty="0">
+              <a:solidFill>
+                <a:srgbClr val="FF0000"/>
+              </a:solidFill>
+              <a:latin typeface="Times New Roman" panose="02020603050405020304" pitchFamily="18" charset="0"/>
+              <a:cs typeface="Times New Roman" panose="02020603050405020304" pitchFamily="18" charset="0"/>
+            </a:endParaRPr>
+          </a:p>
+          <a:p>
+            <a:pPr marL="0" indent="0">
+              <a:buNone/>
+            </a:pPr>
+            <a:endParaRPr lang="pt-BR" sz="2200">
+              <a:latin typeface="Times New Roman" panose="02020603050405020304" pitchFamily="18" charset="0"/>
+              <a:cs typeface="Times New Roman" panose="02020603050405020304" pitchFamily="18" charset="0"/>
+            </a:endParaRPr>
           </a:p>
           <a:p>
             <a:pPr>

</xml_diff>

<commit_message>
Corrige arquivos binários tratados como texto ....
</commit_message>
<xml_diff>
--- a/01 Classes/Aula 10 - Algoritmos e Complexidade - Algoritmos Gulosos.pptx
+++ b/01 Classes/Aula 10 - Algoritmos e Complexidade - Algoritmos Gulosos.pptx
@@ -7141,8 +7141,19 @@
                 <a:latin typeface="Times New Roman" panose="02020603050405020304" pitchFamily="18" charset="0"/>
                 <a:cs typeface="Times New Roman" panose="02020603050405020304" pitchFamily="18" charset="0"/>
               </a:rPr>
-              <a:t>, sem considerar consequências futuras.</a:t>
-            </a:r>
+              <a:t>, sem considerar consequências </a:t>
+            </a:r>
+            <a:r>
+              <a:rPr lang="pt-BR" sz="2400">
+                <a:latin typeface="Times New Roman" panose="02020603050405020304" pitchFamily="18" charset="0"/>
+                <a:cs typeface="Times New Roman" panose="02020603050405020304" pitchFamily="18" charset="0"/>
+              </a:rPr>
+              <a:t>futuras. </a:t>
+            </a:r>
+            <a:endParaRPr lang="pt-BR" sz="2400" dirty="0">
+              <a:latin typeface="Times New Roman" panose="02020603050405020304" pitchFamily="18" charset="0"/>
+              <a:cs typeface="Times New Roman" panose="02020603050405020304" pitchFamily="18" charset="0"/>
+            </a:endParaRPr>
           </a:p>
         </p:txBody>
       </p:sp>

</xml_diff>